<commit_message>
subindo apresentação atualizada versão final
</commit_message>
<xml_diff>
--- a/Documentos/Apresentacao - SICON.pptx
+++ b/Documentos/Apresentacao - SICON.pptx
@@ -12,8 +12,9 @@
     <p:sldId id="265" r:id="rId6"/>
     <p:sldId id="266" r:id="rId7"/>
     <p:sldId id="267" r:id="rId8"/>
-    <p:sldId id="261" r:id="rId9"/>
-    <p:sldId id="262" r:id="rId10"/>
+    <p:sldId id="269" r:id="rId9"/>
+    <p:sldId id="261" r:id="rId10"/>
+    <p:sldId id="262" r:id="rId11"/>
   </p:sldIdLst>
   <p:sldSz cx="9144000" cy="6858000" type="screen4x3"/>
   <p:notesSz cx="6858000" cy="9144000"/>
@@ -114,7 +115,7 @@
   </p:defaultTextStyle>
   <p:extLst>
     <p:ext uri="{EFAFB233-063F-42B5-8137-9DF3F51BA10A}">
-      <p15:sldGuideLst xmlns="" xmlns:p15="http://schemas.microsoft.com/office/powerpoint/2012/main">
+      <p15:sldGuideLst xmlns:p15="http://schemas.microsoft.com/office/powerpoint/2012/main" xmlns="">
         <p15:guide id="1" orient="horz" pos="2160">
           <p15:clr>
             <a:srgbClr val="A4A3A4"/>
@@ -357,7 +358,7 @@
           <a:p>
             <a:fld id="{36BADE80-1FF1-4FEC-9B26-A3983810723B}" type="datetimeFigureOut">
               <a:rPr lang="pt-BR" smtClean="0"/>
-              <a:t>09/07/2018</a:t>
+              <a:t>20/11/2018</a:t>
             </a:fld>
             <a:endParaRPr lang="pt-BR"/>
           </a:p>
@@ -565,7 +566,7 @@
           <a:p>
             <a:fld id="{36BADE80-1FF1-4FEC-9B26-A3983810723B}" type="datetimeFigureOut">
               <a:rPr lang="pt-BR" smtClean="0"/>
-              <a:t>09/07/2018</a:t>
+              <a:t>20/11/2018</a:t>
             </a:fld>
             <a:endParaRPr lang="pt-BR"/>
           </a:p>
@@ -821,7 +822,7 @@
           <a:p>
             <a:fld id="{36BADE80-1FF1-4FEC-9B26-A3983810723B}" type="datetimeFigureOut">
               <a:rPr lang="pt-BR" smtClean="0"/>
-              <a:t>09/07/2018</a:t>
+              <a:t>20/11/2018</a:t>
             </a:fld>
             <a:endParaRPr lang="pt-BR"/>
           </a:p>
@@ -991,7 +992,7 @@
           <a:p>
             <a:fld id="{36BADE80-1FF1-4FEC-9B26-A3983810723B}" type="datetimeFigureOut">
               <a:rPr lang="pt-BR" smtClean="0"/>
-              <a:t>09/07/2018</a:t>
+              <a:t>20/11/2018</a:t>
             </a:fld>
             <a:endParaRPr lang="pt-BR"/>
           </a:p>
@@ -1334,7 +1335,7 @@
           <a:p>
             <a:fld id="{36BADE80-1FF1-4FEC-9B26-A3983810723B}" type="datetimeFigureOut">
               <a:rPr lang="pt-BR" smtClean="0"/>
-              <a:t>09/07/2018</a:t>
+              <a:t>20/11/2018</a:t>
             </a:fld>
             <a:endParaRPr lang="pt-BR"/>
           </a:p>
@@ -1609,7 +1610,7 @@
           <a:p>
             <a:fld id="{36BADE80-1FF1-4FEC-9B26-A3983810723B}" type="datetimeFigureOut">
               <a:rPr lang="pt-BR" smtClean="0"/>
-              <a:t>09/07/2018</a:t>
+              <a:t>20/11/2018</a:t>
             </a:fld>
             <a:endParaRPr lang="pt-BR"/>
           </a:p>
@@ -1988,7 +1989,7 @@
           <a:p>
             <a:fld id="{36BADE80-1FF1-4FEC-9B26-A3983810723B}" type="datetimeFigureOut">
               <a:rPr lang="pt-BR" smtClean="0"/>
-              <a:t>09/07/2018</a:t>
+              <a:t>20/11/2018</a:t>
             </a:fld>
             <a:endParaRPr lang="pt-BR"/>
           </a:p>
@@ -2106,7 +2107,7 @@
           <a:p>
             <a:fld id="{36BADE80-1FF1-4FEC-9B26-A3983810723B}" type="datetimeFigureOut">
               <a:rPr lang="pt-BR" smtClean="0"/>
-              <a:t>09/07/2018</a:t>
+              <a:t>20/11/2018</a:t>
             </a:fld>
             <a:endParaRPr lang="pt-BR"/>
           </a:p>
@@ -2277,7 +2278,7 @@
           <a:p>
             <a:fld id="{36BADE80-1FF1-4FEC-9B26-A3983810723B}" type="datetimeFigureOut">
               <a:rPr lang="pt-BR" smtClean="0"/>
-              <a:t>09/07/2018</a:t>
+              <a:t>20/11/2018</a:t>
             </a:fld>
             <a:endParaRPr lang="pt-BR"/>
           </a:p>
@@ -2631,7 +2632,7 @@
           <a:p>
             <a:fld id="{36BADE80-1FF1-4FEC-9B26-A3983810723B}" type="datetimeFigureOut">
               <a:rPr lang="pt-BR" smtClean="0"/>
-              <a:t>09/07/2018</a:t>
+              <a:t>20/11/2018</a:t>
             </a:fld>
             <a:endParaRPr lang="pt-BR"/>
           </a:p>
@@ -3008,7 +3009,7 @@
           <a:p>
             <a:fld id="{36BADE80-1FF1-4FEC-9B26-A3983810723B}" type="datetimeFigureOut">
               <a:rPr lang="pt-BR" smtClean="0"/>
-              <a:t>09/07/2018</a:t>
+              <a:t>20/11/2018</a:t>
             </a:fld>
             <a:endParaRPr lang="pt-BR"/>
           </a:p>
@@ -3295,7 +3296,7 @@
           <a:p>
             <a:fld id="{36BADE80-1FF1-4FEC-9B26-A3983810723B}" type="datetimeFigureOut">
               <a:rPr lang="pt-BR" smtClean="0"/>
-              <a:t>09/07/2018</a:t>
+              <a:t>20/11/2018</a:t>
             </a:fld>
             <a:endParaRPr lang="pt-BR"/>
           </a:p>
@@ -3831,7 +3832,7 @@
         </p:nvSpPr>
         <p:spPr>
           <a:xfrm>
-            <a:off x="467544" y="764704"/>
+            <a:off x="251520" y="764704"/>
             <a:ext cx="8458200" cy="1470025"/>
           </a:xfrm>
         </p:spPr>
@@ -3876,7 +3877,7 @@
           <a:p>
             <a:pPr algn="l"/>
             <a:r>
-              <a:rPr lang="pt-BR" sz="2000" dirty="0">
+              <a:rPr lang="pt-BR" sz="1400" dirty="0">
                 <a:latin typeface="Verdana" pitchFamily="34" charset="0"/>
                 <a:ea typeface="Verdana" pitchFamily="34" charset="0"/>
               </a:rPr>
@@ -3886,7 +3887,7 @@
           <a:p>
             <a:pPr algn="l"/>
             <a:r>
-              <a:rPr lang="pt-BR" sz="2000" dirty="0">
+              <a:rPr lang="pt-BR" sz="1400" dirty="0">
                 <a:latin typeface="Verdana" pitchFamily="34" charset="0"/>
                 <a:ea typeface="Verdana" pitchFamily="34" charset="0"/>
               </a:rPr>
@@ -3954,6 +3955,178 @@
   <p:clrMapOvr>
     <a:masterClrMapping/>
   </p:clrMapOvr>
+  <p:timing>
+    <p:tnLst>
+      <p:par>
+        <p:cTn id="1" dur="indefinite" restart="never" nodeType="tmRoot"/>
+      </p:par>
+    </p:tnLst>
+  </p:timing>
+</p:sld>
+</file>
+
+<file path=ppt/slides/slide10.xml><?xml version="1.0" encoding="utf-8"?>
+<p:sld xmlns:a="http://schemas.openxmlformats.org/drawingml/2006/main" xmlns:r="http://schemas.openxmlformats.org/officeDocument/2006/relationships" xmlns:p="http://schemas.openxmlformats.org/presentationml/2006/main">
+  <p:cSld>
+    <p:spTree>
+      <p:nvGrpSpPr>
+        <p:cNvPr id="1" name=""/>
+        <p:cNvGrpSpPr/>
+        <p:nvPr/>
+      </p:nvGrpSpPr>
+      <p:grpSpPr>
+        <a:xfrm>
+          <a:off x="0" y="0"/>
+          <a:ext cx="0" cy="0"/>
+          <a:chOff x="0" y="0"/>
+          <a:chExt cx="0" cy="0"/>
+        </a:xfrm>
+      </p:grpSpPr>
+      <p:sp>
+        <p:nvSpPr>
+          <p:cNvPr id="2" name="Título 1"/>
+          <p:cNvSpPr>
+            <a:spLocks noGrp="1"/>
+          </p:cNvSpPr>
+          <p:nvPr>
+            <p:ph type="title"/>
+          </p:nvPr>
+        </p:nvSpPr>
+        <p:spPr/>
+        <p:txBody>
+          <a:bodyPr/>
+          <a:lstStyle/>
+          <a:p>
+            <a:r>
+              <a:rPr lang="pt-BR" dirty="0"/>
+              <a:t>Conclusão</a:t>
+            </a:r>
+          </a:p>
+        </p:txBody>
+      </p:sp>
+      <p:sp>
+        <p:nvSpPr>
+          <p:cNvPr id="3" name="Espaço Reservado para Conteúdo 2"/>
+          <p:cNvSpPr>
+            <a:spLocks noGrp="1"/>
+          </p:cNvSpPr>
+          <p:nvPr>
+            <p:ph idx="1"/>
+          </p:nvPr>
+        </p:nvSpPr>
+        <p:spPr/>
+        <p:txBody>
+          <a:bodyPr vert="horz" anchor="t">
+            <a:normAutofit/>
+          </a:bodyPr>
+          <a:lstStyle/>
+          <a:p>
+            <a:pPr indent="-255905">
+              <a:buFont typeface="Arial"/>
+            </a:pPr>
+            <a:r>
+              <a:rPr lang="pt-BR" sz="2400" dirty="0"/>
+              <a:t>Trabalhos </a:t>
+            </a:r>
+            <a:r>
+              <a:rPr lang="pt-BR" sz="2400" dirty="0" smtClean="0"/>
+              <a:t>Futuros:</a:t>
+            </a:r>
+          </a:p>
+          <a:p>
+            <a:pPr marL="0" indent="0">
+              <a:buNone/>
+            </a:pPr>
+            <a:endParaRPr lang="pt-BR" sz="1100" dirty="0"/>
+          </a:p>
+          <a:p>
+            <a:pPr marL="657860" lvl="1" indent="-246380">
+              <a:buFont typeface="Arial"/>
+              <a:buChar char="•"/>
+            </a:pPr>
+            <a:r>
+              <a:rPr lang="pt-BR" sz="2200" dirty="0">
+                <a:solidFill>
+                  <a:srgbClr val="000000"/>
+                </a:solidFill>
+              </a:rPr>
+              <a:t>Automatização do lançamento dos honorários</a:t>
+            </a:r>
+          </a:p>
+          <a:p>
+            <a:pPr marL="657860" lvl="1" indent="-246380">
+              <a:buFont typeface="Arial"/>
+              <a:buChar char="•"/>
+            </a:pPr>
+            <a:r>
+              <a:rPr lang="pt-BR" sz="2200" dirty="0">
+                <a:solidFill>
+                  <a:srgbClr val="000000"/>
+                </a:solidFill>
+              </a:rPr>
+              <a:t>Implementação de Juros e </a:t>
+            </a:r>
+            <a:r>
+              <a:rPr lang="pt-BR" sz="2200" dirty="0" smtClean="0">
+                <a:solidFill>
+                  <a:srgbClr val="000000"/>
+                </a:solidFill>
+              </a:rPr>
+              <a:t>multa</a:t>
+            </a:r>
+            <a:endParaRPr lang="pt-BR" sz="2200" dirty="0">
+              <a:solidFill>
+                <a:srgbClr val="000000"/>
+              </a:solidFill>
+            </a:endParaRPr>
+          </a:p>
+          <a:p>
+            <a:pPr marL="657860" lvl="1" indent="-246380">
+              <a:buFont typeface="Arial"/>
+              <a:buChar char="•"/>
+            </a:pPr>
+            <a:r>
+              <a:rPr lang="pt-BR" sz="2200" dirty="0">
+                <a:solidFill>
+                  <a:srgbClr val="000000"/>
+                </a:solidFill>
+              </a:rPr>
+              <a:t>Conclusão dos relatórios</a:t>
+            </a:r>
+          </a:p>
+          <a:p>
+            <a:pPr marL="657860" lvl="1" indent="-246380">
+              <a:buFont typeface="Arial"/>
+              <a:buChar char="•"/>
+            </a:pPr>
+            <a:r>
+              <a:rPr lang="pt-BR" sz="2200" dirty="0">
+                <a:solidFill>
+                  <a:srgbClr val="000000"/>
+                </a:solidFill>
+              </a:rPr>
+              <a:t>Correções após nova entrevista com funcionários do escritório</a:t>
+            </a:r>
+          </a:p>
+        </p:txBody>
+      </p:sp>
+    </p:spTree>
+    <p:extLst>
+      <p:ext uri="{BB962C8B-B14F-4D97-AF65-F5344CB8AC3E}">
+        <p14:creationId xmlns:p14="http://schemas.microsoft.com/office/powerpoint/2010/main" val="623997881"/>
+      </p:ext>
+    </p:extLst>
+  </p:cSld>
+  <p:clrMapOvr>
+    <a:masterClrMapping/>
+  </p:clrMapOvr>
+  <p:timing>
+    <p:tnLst>
+      <p:par>
+        <p:cTn id="1" dur="indefinite" restart="never" nodeType="tmRoot"/>
+      </p:par>
+    </p:tnLst>
+  </p:timing>
 </p:sld>
 </file>
 
@@ -4098,6 +4271,13 @@
   <p:clrMapOvr>
     <a:masterClrMapping/>
   </p:clrMapOvr>
+  <p:timing>
+    <p:tnLst>
+      <p:par>
+        <p:cTn id="1" dur="indefinite" restart="never" nodeType="tmRoot"/>
+      </p:par>
+    </p:tnLst>
+  </p:timing>
 </p:sld>
 </file>
 
@@ -4266,6 +4446,13 @@
   <p:clrMapOvr>
     <a:masterClrMapping/>
   </p:clrMapOvr>
+  <p:timing>
+    <p:tnLst>
+      <p:par>
+        <p:cTn id="1" dur="indefinite" restart="never" nodeType="tmRoot"/>
+      </p:par>
+    </p:tnLst>
+  </p:timing>
 </p:sld>
 </file>
 
@@ -4373,6 +4560,13 @@
   <p:clrMapOvr>
     <a:masterClrMapping/>
   </p:clrMapOvr>
+  <p:timing>
+    <p:tnLst>
+      <p:par>
+        <p:cTn id="1" dur="indefinite" restart="never" nodeType="tmRoot"/>
+      </p:par>
+    </p:tnLst>
+  </p:timing>
 </p:sld>
 </file>
 
@@ -4398,7 +4592,7 @@
           <p:cNvPr id="2" name="Título 1">
             <a:extLst>
               <a:ext uri="{FF2B5EF4-FFF2-40B4-BE49-F238E27FC236}">
-                <a16:creationId xmlns="" xmlns:a16="http://schemas.microsoft.com/office/drawing/2014/main" id="{C9E48680-4332-4958-BF41-66588DF06C2B}"/>
+                <a16:creationId xmlns:a16="http://schemas.microsoft.com/office/drawing/2014/main" xmlns="" id="{C9E48680-4332-4958-BF41-66588DF06C2B}"/>
               </a:ext>
             </a:extLst>
           </p:cNvPr>
@@ -4431,7 +4625,7 @@
           <p:cNvPr id="3" name="Espaço Reservado para Conteúdo 2">
             <a:extLst>
               <a:ext uri="{FF2B5EF4-FFF2-40B4-BE49-F238E27FC236}">
-                <a16:creationId xmlns="" xmlns:a16="http://schemas.microsoft.com/office/drawing/2014/main" id="{4F81A6E2-6F1A-42D5-ABF4-4F2FC11F4FE0}"/>
+                <a16:creationId xmlns:a16="http://schemas.microsoft.com/office/drawing/2014/main" xmlns="" id="{4F81A6E2-6F1A-42D5-ABF4-4F2FC11F4FE0}"/>
               </a:ext>
             </a:extLst>
           </p:cNvPr>
@@ -4523,6 +4717,13 @@
   <p:clrMapOvr>
     <a:masterClrMapping/>
   </p:clrMapOvr>
+  <p:timing>
+    <p:tnLst>
+      <p:par>
+        <p:cTn id="1" dur="indefinite" restart="never" nodeType="tmRoot"/>
+      </p:par>
+    </p:tnLst>
+  </p:timing>
 </p:sld>
 </file>
 
@@ -4548,7 +4749,7 @@
           <p:cNvPr id="2" name="Título 1">
             <a:extLst>
               <a:ext uri="{FF2B5EF4-FFF2-40B4-BE49-F238E27FC236}">
-                <a16:creationId xmlns="" xmlns:a16="http://schemas.microsoft.com/office/drawing/2014/main" id="{12B72C2F-D778-458E-B37F-F7A3CDCB874E}"/>
+                <a16:creationId xmlns:a16="http://schemas.microsoft.com/office/drawing/2014/main" xmlns="" id="{12B72C2F-D778-458E-B37F-F7A3CDCB874E}"/>
               </a:ext>
             </a:extLst>
           </p:cNvPr>
@@ -4581,7 +4782,7 @@
           <p:cNvPr id="3" name="Espaço Reservado para Conteúdo 2">
             <a:extLst>
               <a:ext uri="{FF2B5EF4-FFF2-40B4-BE49-F238E27FC236}">
-                <a16:creationId xmlns="" xmlns:a16="http://schemas.microsoft.com/office/drawing/2014/main" id="{FD8C0EC6-7046-4175-BF98-F63B782BF238}"/>
+                <a16:creationId xmlns:a16="http://schemas.microsoft.com/office/drawing/2014/main" xmlns="" id="{FD8C0EC6-7046-4175-BF98-F63B782BF238}"/>
               </a:ext>
             </a:extLst>
           </p:cNvPr>
@@ -4633,6 +4834,13 @@
   <p:clrMapOvr>
     <a:masterClrMapping/>
   </p:clrMapOvr>
+  <p:timing>
+    <p:tnLst>
+      <p:par>
+        <p:cTn id="1" dur="indefinite" restart="never" nodeType="tmRoot"/>
+      </p:par>
+    </p:tnLst>
+  </p:timing>
 </p:sld>
 </file>
 
@@ -4653,83 +4861,83 @@
           <a:chExt cx="0" cy="0"/>
         </a:xfrm>
       </p:grpSpPr>
-      <p:pic>
-        <p:nvPicPr>
-          <p:cNvPr id="2" name="Imagem 2" descr="Uma imagem contendo captura de tela&#10;&#10;Descrição gerada com muito alta confiança">
+      <p:sp>
+        <p:nvSpPr>
+          <p:cNvPr id="5" name="Título 1">
             <a:extLst>
               <a:ext uri="{FF2B5EF4-FFF2-40B4-BE49-F238E27FC236}">
-                <a16:creationId xmlns="" xmlns:a16="http://schemas.microsoft.com/office/drawing/2014/main" id="{113C57C0-0CF6-4251-9EB3-66EC69DD8329}"/>
+                <a16:creationId xmlns:a16="http://schemas.microsoft.com/office/drawing/2014/main" xmlns="" id="{4806A5D4-E1AF-4C9E-8DA6-914FA0B0BD7A}"/>
               </a:ext>
             </a:extLst>
           </p:cNvPr>
+          <p:cNvSpPr>
+            <a:spLocks noGrp="1"/>
+          </p:cNvSpPr>
+          <p:nvPr>
+            <p:ph type="title"/>
+          </p:nvPr>
+        </p:nvSpPr>
+        <p:spPr>
+          <a:xfrm>
+            <a:off x="785445" y="977278"/>
+            <a:ext cx="6347713" cy="1320800"/>
+          </a:xfrm>
+        </p:spPr>
+        <p:txBody>
+          <a:bodyPr>
+            <a:normAutofit fontScale="90000"/>
+          </a:bodyPr>
+          <a:lstStyle/>
+          <a:p>
+            <a:r>
+              <a:rPr lang="pt-BR" dirty="0"/>
+              <a:t>Proposta de Solução</a:t>
+            </a:r>
+            <a:r>
+              <a:rPr lang="pt-BR" dirty="0">
+                <a:cs typeface="Calibri Light"/>
+              </a:rPr>
+              <a:t/>
+            </a:r>
+            <a:br>
+              <a:rPr lang="pt-BR" dirty="0">
+                <a:cs typeface="Calibri Light"/>
+              </a:rPr>
+            </a:br>
+            <a:endParaRPr lang="pt-BR" dirty="0"/>
+          </a:p>
+        </p:txBody>
+      </p:sp>
+      <p:pic>
+        <p:nvPicPr>
+          <p:cNvPr id="3" name="Imagem 2"/>
           <p:cNvPicPr>
             <a:picLocks noChangeAspect="1"/>
           </p:cNvPicPr>
           <p:nvPr/>
         </p:nvPicPr>
         <p:blipFill>
-          <a:blip r:embed="rId2"/>
+          <a:blip r:embed="rId2">
+            <a:extLst>
+              <a:ext uri="{28A0092B-C50C-407E-A947-70E740481C1C}">
+                <a14:useLocalDpi xmlns:a14="http://schemas.microsoft.com/office/drawing/2010/main" val="0"/>
+              </a:ext>
+            </a:extLst>
+          </a:blip>
           <a:stretch>
             <a:fillRect/>
           </a:stretch>
         </p:blipFill>
         <p:spPr>
           <a:xfrm>
-            <a:off x="499979" y="1912725"/>
-            <a:ext cx="8251550" cy="4221310"/>
+            <a:off x="899592" y="1844824"/>
+            <a:ext cx="7248894" cy="3960440"/>
           </a:xfrm>
           <a:prstGeom prst="rect">
             <a:avLst/>
           </a:prstGeom>
         </p:spPr>
       </p:pic>
-      <p:sp>
-        <p:nvSpPr>
-          <p:cNvPr id="5" name="Título 1">
-            <a:extLst>
-              <a:ext uri="{FF2B5EF4-FFF2-40B4-BE49-F238E27FC236}">
-                <a16:creationId xmlns="" xmlns:a16="http://schemas.microsoft.com/office/drawing/2014/main" id="{4806A5D4-E1AF-4C9E-8DA6-914FA0B0BD7A}"/>
-              </a:ext>
-            </a:extLst>
-          </p:cNvPr>
-          <p:cNvSpPr>
-            <a:spLocks noGrp="1"/>
-          </p:cNvSpPr>
-          <p:nvPr>
-            <p:ph type="title"/>
-          </p:nvPr>
-        </p:nvSpPr>
-        <p:spPr>
-          <a:xfrm>
-            <a:off x="785445" y="977278"/>
-            <a:ext cx="6347713" cy="1320800"/>
-          </a:xfrm>
-        </p:spPr>
-        <p:txBody>
-          <a:bodyPr>
-            <a:normAutofit fontScale="90000"/>
-          </a:bodyPr>
-          <a:lstStyle/>
-          <a:p>
-            <a:r>
-              <a:rPr lang="pt-BR" dirty="0"/>
-              <a:t>Proposta de Solução</a:t>
-            </a:r>
-            <a:r>
-              <a:rPr lang="pt-BR" dirty="0">
-                <a:cs typeface="Calibri Light"/>
-              </a:rPr>
-              <a:t/>
-            </a:r>
-            <a:br>
-              <a:rPr lang="pt-BR" dirty="0">
-                <a:cs typeface="Calibri Light"/>
-              </a:rPr>
-            </a:br>
-            <a:endParaRPr lang="pt-BR" dirty="0"/>
-          </a:p>
-        </p:txBody>
-      </p:sp>
     </p:spTree>
     <p:extLst>
       <p:ext uri="{BB962C8B-B14F-4D97-AF65-F5344CB8AC3E}">
@@ -4740,6 +4948,13 @@
   <p:clrMapOvr>
     <a:masterClrMapping/>
   </p:clrMapOvr>
+  <p:timing>
+    <p:tnLst>
+      <p:par>
+        <p:cTn id="1" dur="indefinite" restart="never" nodeType="tmRoot"/>
+      </p:par>
+    </p:tnLst>
+  </p:timing>
 </p:sld>
 </file>
 
@@ -4776,152 +4991,70 @@
           <a:lstStyle/>
           <a:p>
             <a:r>
-              <a:rPr lang="pt-BR" dirty="0"/>
-              <a:t>Conclusão</a:t>
-            </a:r>
-          </a:p>
-        </p:txBody>
-      </p:sp>
-      <p:sp>
-        <p:nvSpPr>
-          <p:cNvPr id="3" name="Espaço Reservado para Conteúdo 2"/>
-          <p:cNvSpPr>
-            <a:spLocks noGrp="1"/>
-          </p:cNvSpPr>
-          <p:nvPr>
-            <p:ph idx="1"/>
-          </p:nvPr>
-        </p:nvSpPr>
-        <p:spPr/>
-        <p:txBody>
-          <a:bodyPr vert="horz" anchor="t">
+              <a:rPr lang="pt-BR" dirty="0" smtClean="0"/>
+              <a:t>Demonstração do Sistema</a:t>
+            </a:r>
+            <a:endParaRPr lang="pt-BR" dirty="0"/>
+          </a:p>
+        </p:txBody>
+      </p:sp>
+      <p:sp>
+        <p:nvSpPr>
+          <p:cNvPr id="5" name="Título 1"/>
+          <p:cNvSpPr txBox="1">
+            <a:spLocks/>
+          </p:cNvSpPr>
+          <p:nvPr/>
+        </p:nvSpPr>
+        <p:spPr>
+          <a:xfrm>
+            <a:off x="611560" y="2490244"/>
+            <a:ext cx="7543800" cy="1368152"/>
+          </a:xfrm>
+          <a:prstGeom prst="rect">
+            <a:avLst/>
+          </a:prstGeom>
+        </p:spPr>
+        <p:txBody>
+          <a:bodyPr vert="horz" lIns="91440" tIns="45720" rIns="91440" bIns="45720" rtlCol="0" anchor="b">
             <a:normAutofit/>
           </a:bodyPr>
-          <a:lstStyle/>
-          <a:p>
-            <a:pPr indent="-255905">
+          <a:lstStyle>
+            <a:lvl1pPr algn="l" defTabSz="914400" rtl="0" eaLnBrk="1" latinLnBrk="0" hangingPunct="1">
               <a:lnSpc>
-                <a:spcPct val="100000"/>
+                <a:spcPct val="85000"/>
               </a:lnSpc>
-              <a:buFont typeface="Arial"/>
-            </a:pPr>
-            <a:endParaRPr lang="pt-BR" sz="1100" dirty="0" smtClean="0">
-              <a:latin typeface="Verdana" pitchFamily="34" charset="0"/>
-              <a:ea typeface="Verdana" pitchFamily="34" charset="0"/>
-            </a:endParaRPr>
-          </a:p>
-          <a:p>
-            <a:pPr indent="-255905">
-              <a:lnSpc>
-                <a:spcPct val="100000"/>
-              </a:lnSpc>
-              <a:buFont typeface="Arial"/>
-            </a:pPr>
-            <a:r>
-              <a:rPr lang="pt-BR" sz="2400" dirty="0" smtClean="0">
-                <a:latin typeface="Verdana" pitchFamily="34" charset="0"/>
-                <a:ea typeface="Verdana" pitchFamily="34" charset="0"/>
-              </a:rPr>
-              <a:t> Melhorias Apresentadas:</a:t>
-            </a:r>
-          </a:p>
-          <a:p>
-            <a:pPr indent="-255905">
-              <a:buFont typeface="Arial"/>
-            </a:pPr>
-            <a:endParaRPr lang="pt-BR" sz="2400" dirty="0" smtClean="0">
-              <a:latin typeface="Verdana" pitchFamily="34" charset="0"/>
-              <a:ea typeface="Verdana" pitchFamily="34" charset="0"/>
-            </a:endParaRPr>
-          </a:p>
-          <a:p>
-            <a:pPr marL="754380" lvl="1" indent="-342900"/>
-            <a:r>
-              <a:rPr lang="pt-BR" sz="2200" dirty="0" smtClean="0">
+              <a:spcBef>
+                <a:spcPct val="0"/>
+              </a:spcBef>
+              <a:buNone/>
+              <a:defRPr sz="4800" kern="1200" spc="-50" baseline="0">
                 <a:solidFill>
-                  <a:srgbClr val="000000"/>
+                  <a:schemeClr val="tx1">
+                    <a:lumMod val="75000"/>
+                    <a:lumOff val="25000"/>
+                  </a:schemeClr>
                 </a:solidFill>
-                <a:latin typeface="Verdana" pitchFamily="34" charset="0"/>
-                <a:ea typeface="Verdana" pitchFamily="34" charset="0"/>
-              </a:rPr>
-              <a:t>Informatização </a:t>
-            </a:r>
-            <a:r>
-              <a:rPr lang="pt-BR" sz="2200" dirty="0">
-                <a:solidFill>
-                  <a:srgbClr val="000000"/>
-                </a:solidFill>
-                <a:latin typeface="Verdana" pitchFamily="34" charset="0"/>
-                <a:ea typeface="Verdana" pitchFamily="34" charset="0"/>
-              </a:rPr>
-              <a:t>dos </a:t>
-            </a:r>
-            <a:r>
-              <a:rPr lang="pt-BR" sz="2200" dirty="0" smtClean="0">
-                <a:solidFill>
-                  <a:srgbClr val="000000"/>
-                </a:solidFill>
-                <a:latin typeface="Verdana" pitchFamily="34" charset="0"/>
-                <a:ea typeface="Verdana" pitchFamily="34" charset="0"/>
-              </a:rPr>
-              <a:t>processos</a:t>
-            </a:r>
-          </a:p>
-          <a:p>
-            <a:pPr marL="754380" lvl="1" indent="-342900"/>
-            <a:r>
-              <a:rPr lang="pt-BR" sz="2200" dirty="0" smtClean="0">
-                <a:solidFill>
-                  <a:srgbClr val="000000"/>
-                </a:solidFill>
-                <a:latin typeface="Verdana" pitchFamily="34" charset="0"/>
-                <a:ea typeface="Verdana" pitchFamily="34" charset="0"/>
-              </a:rPr>
-              <a:t>Velocidade</a:t>
-            </a:r>
-          </a:p>
-          <a:p>
-            <a:pPr marL="754380" lvl="1" indent="-342900"/>
-            <a:r>
-              <a:rPr lang="pt-BR" sz="2200" dirty="0" smtClean="0">
-                <a:solidFill>
-                  <a:srgbClr val="000000"/>
-                </a:solidFill>
-                <a:latin typeface="Verdana" pitchFamily="34" charset="0"/>
-                <a:ea typeface="Verdana" pitchFamily="34" charset="0"/>
-              </a:rPr>
-              <a:t>Confiabilidade</a:t>
-            </a:r>
-          </a:p>
-          <a:p>
-            <a:pPr marL="754380" lvl="1" indent="-342900"/>
-            <a:r>
-              <a:rPr lang="pt-BR" sz="2200" dirty="0" smtClean="0">
-                <a:solidFill>
-                  <a:srgbClr val="000000"/>
-                </a:solidFill>
-                <a:latin typeface="Verdana" pitchFamily="34" charset="0"/>
-                <a:ea typeface="Verdana" pitchFamily="34" charset="0"/>
-              </a:rPr>
-              <a:t>Facilidade </a:t>
-            </a:r>
-            <a:r>
-              <a:rPr lang="pt-BR" sz="2200" dirty="0">
-                <a:solidFill>
-                  <a:srgbClr val="000000"/>
-                </a:solidFill>
-                <a:latin typeface="Verdana" pitchFamily="34" charset="0"/>
-                <a:ea typeface="Verdana" pitchFamily="34" charset="0"/>
-              </a:rPr>
-              <a:t>de acesso aos dados</a:t>
-            </a:r>
+                <a:latin typeface="+mj-lt"/>
+                <a:ea typeface="+mj-ea"/>
+                <a:cs typeface="+mj-cs"/>
+              </a:defRPr>
+            </a:lvl1pPr>
+          </a:lstStyle>
+          <a:p>
+            <a:pPr algn="ctr"/>
+            <a:r>
+              <a:rPr lang="pt-BR" dirty="0" smtClean="0"/>
+              <a:t>SICON</a:t>
+            </a:r>
+            <a:endParaRPr lang="pt-BR" dirty="0"/>
           </a:p>
         </p:txBody>
       </p:sp>
     </p:spTree>
     <p:extLst>
       <p:ext uri="{BB962C8B-B14F-4D97-AF65-F5344CB8AC3E}">
-        <p14:creationId xmlns:p14="http://schemas.microsoft.com/office/powerpoint/2010/main" val="932600480"/>
+        <p14:creationId xmlns:p14="http://schemas.microsoft.com/office/powerpoint/2010/main" val="1426477738"/>
       </p:ext>
     </p:extLst>
   </p:cSld>
@@ -4988,90 +5121,120 @@
           <a:lstStyle/>
           <a:p>
             <a:pPr indent="-255905">
+              <a:lnSpc>
+                <a:spcPct val="100000"/>
+              </a:lnSpc>
               <a:buFont typeface="Arial"/>
             </a:pPr>
-            <a:r>
-              <a:rPr lang="pt-BR" sz="2400" dirty="0"/>
-              <a:t>Trabalhos </a:t>
-            </a:r>
-            <a:r>
-              <a:rPr lang="pt-BR" sz="2400" dirty="0" smtClean="0"/>
-              <a:t>Futuros:</a:t>
-            </a:r>
-          </a:p>
-          <a:p>
-            <a:pPr marL="0" indent="0">
-              <a:buNone/>
+            <a:endParaRPr lang="pt-BR" sz="1100" dirty="0" smtClean="0">
+              <a:latin typeface="Verdana" pitchFamily="34" charset="0"/>
+              <a:ea typeface="Verdana" pitchFamily="34" charset="0"/>
+            </a:endParaRPr>
+          </a:p>
+          <a:p>
+            <a:pPr indent="-255905">
+              <a:lnSpc>
+                <a:spcPct val="100000"/>
+              </a:lnSpc>
+              <a:buFont typeface="Arial"/>
             </a:pPr>
-            <a:endParaRPr lang="pt-BR" sz="1100" dirty="0"/>
-          </a:p>
-          <a:p>
-            <a:pPr marL="657860" lvl="1" indent="-246380">
+            <a:r>
+              <a:rPr lang="pt-BR" sz="2400" dirty="0" smtClean="0">
+                <a:latin typeface="Verdana" pitchFamily="34" charset="0"/>
+                <a:ea typeface="Verdana" pitchFamily="34" charset="0"/>
+              </a:rPr>
+              <a:t> Melhorias Apresentadas:</a:t>
+            </a:r>
+          </a:p>
+          <a:p>
+            <a:pPr indent="-255905">
               <a:buFont typeface="Arial"/>
-              <a:buChar char="•"/>
             </a:pPr>
+            <a:endParaRPr lang="pt-BR" sz="2400" dirty="0" smtClean="0">
+              <a:latin typeface="Verdana" pitchFamily="34" charset="0"/>
+              <a:ea typeface="Verdana" pitchFamily="34" charset="0"/>
+            </a:endParaRPr>
+          </a:p>
+          <a:p>
+            <a:pPr marL="754380" lvl="1" indent="-342900"/>
+            <a:r>
+              <a:rPr lang="pt-BR" sz="2200" dirty="0" smtClean="0">
+                <a:solidFill>
+                  <a:srgbClr val="000000"/>
+                </a:solidFill>
+                <a:latin typeface="Verdana" pitchFamily="34" charset="0"/>
+                <a:ea typeface="Verdana" pitchFamily="34" charset="0"/>
+              </a:rPr>
+              <a:t>Informatização </a:t>
+            </a:r>
             <a:r>
               <a:rPr lang="pt-BR" sz="2200" dirty="0">
                 <a:solidFill>
                   <a:srgbClr val="000000"/>
                 </a:solidFill>
+                <a:latin typeface="Verdana" pitchFamily="34" charset="0"/>
+                <a:ea typeface="Verdana" pitchFamily="34" charset="0"/>
               </a:rPr>
-              <a:t>Automatização do lançamento dos honorários</a:t>
-            </a:r>
-          </a:p>
-          <a:p>
-            <a:pPr marL="657860" lvl="1" indent="-246380">
-              <a:buFont typeface="Arial"/>
-              <a:buChar char="•"/>
-            </a:pPr>
+              <a:t>dos </a:t>
+            </a:r>
+            <a:r>
+              <a:rPr lang="pt-BR" sz="2200" dirty="0" smtClean="0">
+                <a:solidFill>
+                  <a:srgbClr val="000000"/>
+                </a:solidFill>
+                <a:latin typeface="Verdana" pitchFamily="34" charset="0"/>
+                <a:ea typeface="Verdana" pitchFamily="34" charset="0"/>
+              </a:rPr>
+              <a:t>processos</a:t>
+            </a:r>
+          </a:p>
+          <a:p>
+            <a:pPr marL="754380" lvl="1" indent="-342900"/>
+            <a:r>
+              <a:rPr lang="pt-BR" sz="2200" dirty="0" smtClean="0">
+                <a:solidFill>
+                  <a:srgbClr val="000000"/>
+                </a:solidFill>
+                <a:latin typeface="Verdana" pitchFamily="34" charset="0"/>
+                <a:ea typeface="Verdana" pitchFamily="34" charset="0"/>
+              </a:rPr>
+              <a:t>Velocidade</a:t>
+            </a:r>
+          </a:p>
+          <a:p>
+            <a:pPr marL="754380" lvl="1" indent="-342900"/>
+            <a:r>
+              <a:rPr lang="pt-BR" sz="2200" dirty="0" smtClean="0">
+                <a:solidFill>
+                  <a:srgbClr val="000000"/>
+                </a:solidFill>
+                <a:latin typeface="Verdana" pitchFamily="34" charset="0"/>
+                <a:ea typeface="Verdana" pitchFamily="34" charset="0"/>
+              </a:rPr>
+              <a:t>Confiabilidade</a:t>
+            </a:r>
+          </a:p>
+          <a:p>
+            <a:pPr marL="754380" lvl="1" indent="-342900"/>
+            <a:r>
+              <a:rPr lang="pt-BR" sz="2200" dirty="0" smtClean="0">
+                <a:solidFill>
+                  <a:srgbClr val="000000"/>
+                </a:solidFill>
+                <a:latin typeface="Verdana" pitchFamily="34" charset="0"/>
+                <a:ea typeface="Verdana" pitchFamily="34" charset="0"/>
+              </a:rPr>
+              <a:t>Facilidade </a:t>
+            </a:r>
             <a:r>
               <a:rPr lang="pt-BR" sz="2200" dirty="0">
                 <a:solidFill>
                   <a:srgbClr val="000000"/>
                 </a:solidFill>
+                <a:latin typeface="Verdana" pitchFamily="34" charset="0"/>
+                <a:ea typeface="Verdana" pitchFamily="34" charset="0"/>
               </a:rPr>
-              <a:t>Implementação de Juros e </a:t>
-            </a:r>
-            <a:r>
-              <a:rPr lang="pt-BR" sz="2200" dirty="0" smtClean="0">
-                <a:solidFill>
-                  <a:srgbClr val="000000"/>
-                </a:solidFill>
-              </a:rPr>
-              <a:t>multa</a:t>
-            </a:r>
-            <a:endParaRPr lang="pt-BR" sz="2200" dirty="0">
-              <a:solidFill>
-                <a:srgbClr val="000000"/>
-              </a:solidFill>
-            </a:endParaRPr>
-          </a:p>
-          <a:p>
-            <a:pPr marL="657860" lvl="1" indent="-246380">
-              <a:buFont typeface="Arial"/>
-              <a:buChar char="•"/>
-            </a:pPr>
-            <a:r>
-              <a:rPr lang="pt-BR" sz="2200" dirty="0">
-                <a:solidFill>
-                  <a:srgbClr val="000000"/>
-                </a:solidFill>
-              </a:rPr>
-              <a:t>Conclusão dos relatórios</a:t>
-            </a:r>
-          </a:p>
-          <a:p>
-            <a:pPr marL="657860" lvl="1" indent="-246380">
-              <a:buFont typeface="Arial"/>
-              <a:buChar char="•"/>
-            </a:pPr>
-            <a:r>
-              <a:rPr lang="pt-BR" sz="2200" dirty="0">
-                <a:solidFill>
-                  <a:srgbClr val="000000"/>
-                </a:solidFill>
-              </a:rPr>
-              <a:t>Correções após nova entrevista com funcionários do escritório</a:t>
+              <a:t>de acesso aos dados</a:t>
             </a:r>
           </a:p>
         </p:txBody>
@@ -5079,13 +5242,20 @@
     </p:spTree>
     <p:extLst>
       <p:ext uri="{BB962C8B-B14F-4D97-AF65-F5344CB8AC3E}">
-        <p14:creationId xmlns:p14="http://schemas.microsoft.com/office/powerpoint/2010/main" val="623997881"/>
+        <p14:creationId xmlns:p14="http://schemas.microsoft.com/office/powerpoint/2010/main" val="932600480"/>
       </p:ext>
     </p:extLst>
   </p:cSld>
   <p:clrMapOvr>
     <a:masterClrMapping/>
   </p:clrMapOvr>
+  <p:timing>
+    <p:tnLst>
+      <p:par>
+        <p:cTn id="1" dur="indefinite" restart="never" nodeType="tmRoot"/>
+      </p:par>
+    </p:tnLst>
+  </p:timing>
 </p:sld>
 </file>
 
@@ -5366,7 +5536,7 @@
   <a:extraClrSchemeLst/>
   <a:extLst>
     <a:ext uri="{05A4C25C-085E-4340-85A3-A5531E510DB2}">
-      <thm15:themeFamily xmlns="" xmlns:thm15="http://schemas.microsoft.com/office/thememl/2012/main" name="Retrospect" id="{5F128B03-DCCA-4EEB-AB3B-CF2899314A46}" vid="{D26EA377-59BD-4C9C-9D94-EE8416EE4C79}"/>
+      <thm15:themeFamily xmlns:thm15="http://schemas.microsoft.com/office/thememl/2012/main" xmlns="" name="Retrospect" id="{5F128B03-DCCA-4EEB-AB3B-CF2899314A46}" vid="{D26EA377-59BD-4C9C-9D94-EE8416EE4C79}"/>
     </a:ext>
   </a:extLst>
 </a:theme>

</xml_diff>